<commit_message>
neues modell erstellt + manuskript geupdatet
</commit_message>
<xml_diff>
--- a/02_paper/02_study/02_expertise_paper/pictures/Professional_Competence_Model.pptx
+++ b/02_paper/02_study/02_expertise_paper/pictures/Professional_Competence_Model.pptx
@@ -104,7 +104,57 @@
       </a:defRPr>
     </a:lvl9pPr>
   </p:defaultTextStyle>
+  <p:extLst>
+    <p:ext uri="{EFAFB233-063F-42B5-8137-9DF3F51BA10A}">
+      <p15:sldGuideLst xmlns:p15="http://schemas.microsoft.com/office/powerpoint/2012/main"/>
+    </p:ext>
+  </p:extLst>
 </p:presentation>
+</file>
+
+<file path=ppt/changesInfos/changesInfo1.xml><?xml version="1.0" encoding="utf-8"?>
+<pc:chgInfo xmlns:a="http://schemas.openxmlformats.org/drawingml/2006/main" xmlns:r="http://schemas.openxmlformats.org/officeDocument/2006/relationships" xmlns:ac="http://schemas.microsoft.com/office/drawing/2013/main/command" xmlns:pc="http://schemas.microsoft.com/office/powerpoint/2013/main/command">
+  <pc:docChgLst>
+    <pc:chgData name="Mandy Klatt" userId="505858402c07da9d" providerId="LiveId" clId="{FA5EC466-BD05-4DCC-91DA-EA1E98BFA00F}"/>
+    <pc:docChg chg="modSld">
+      <pc:chgData name="Mandy Klatt" userId="505858402c07da9d" providerId="LiveId" clId="{FA5EC466-BD05-4DCC-91DA-EA1E98BFA00F}" dt="2025-03-19T10:05:22.331" v="152" actId="1076"/>
+      <pc:docMkLst>
+        <pc:docMk/>
+      </pc:docMkLst>
+      <pc:sldChg chg="modSp mod">
+        <pc:chgData name="Mandy Klatt" userId="505858402c07da9d" providerId="LiveId" clId="{FA5EC466-BD05-4DCC-91DA-EA1E98BFA00F}" dt="2025-03-19T10:05:22.331" v="152" actId="1076"/>
+        <pc:sldMkLst>
+          <pc:docMk/>
+          <pc:sldMk cId="387449015" sldId="256"/>
+        </pc:sldMkLst>
+        <pc:spChg chg="mod">
+          <ac:chgData name="Mandy Klatt" userId="505858402c07da9d" providerId="LiveId" clId="{FA5EC466-BD05-4DCC-91DA-EA1E98BFA00F}" dt="2025-03-19T09:55:42.953" v="104" actId="1076"/>
+          <ac:spMkLst>
+            <pc:docMk/>
+            <pc:sldMk cId="387449015" sldId="256"/>
+            <ac:spMk id="4" creationId="{8845498C-17CA-478F-A2CE-9EEED5D69AA7}"/>
+          </ac:spMkLst>
+        </pc:spChg>
+        <pc:spChg chg="mod">
+          <ac:chgData name="Mandy Klatt" userId="505858402c07da9d" providerId="LiveId" clId="{FA5EC466-BD05-4DCC-91DA-EA1E98BFA00F}" dt="2025-03-19T10:05:19.916" v="151" actId="1076"/>
+          <ac:spMkLst>
+            <pc:docMk/>
+            <pc:sldMk cId="387449015" sldId="256"/>
+            <ac:spMk id="5" creationId="{E16B618F-BDBC-4486-8B54-D88B6EC8E637}"/>
+          </ac:spMkLst>
+        </pc:spChg>
+        <pc:spChg chg="mod">
+          <ac:chgData name="Mandy Klatt" userId="505858402c07da9d" providerId="LiveId" clId="{FA5EC466-BD05-4DCC-91DA-EA1E98BFA00F}" dt="2025-03-19T10:05:22.331" v="152" actId="1076"/>
+          <ac:spMkLst>
+            <pc:docMk/>
+            <pc:sldMk cId="387449015" sldId="256"/>
+            <ac:spMk id="6" creationId="{05BFDD83-8A7C-4409-9548-42B073B0C9D0}"/>
+          </ac:spMkLst>
+        </pc:spChg>
+      </pc:sldChg>
+    </pc:docChg>
+  </pc:docChgLst>
+</pc:chgInfo>
 </file>
 
 <file path=ppt/slideLayouts/slideLayout1.xml><?xml version="1.0" encoding="utf-8"?>
@@ -254,7 +304,7 @@
           <a:p>
             <a:fld id="{D999196E-D4C6-4B69-A492-D961CA2AEF86}" type="datetimeFigureOut">
               <a:rPr lang="de-DE" smtClean="0"/>
-              <a:t>18.03.2025</a:t>
+              <a:t>19.03.2025</a:t>
             </a:fld>
             <a:endParaRPr lang="de-DE"/>
           </a:p>
@@ -452,7 +502,7 @@
           <a:p>
             <a:fld id="{D999196E-D4C6-4B69-A492-D961CA2AEF86}" type="datetimeFigureOut">
               <a:rPr lang="de-DE" smtClean="0"/>
-              <a:t>18.03.2025</a:t>
+              <a:t>19.03.2025</a:t>
             </a:fld>
             <a:endParaRPr lang="de-DE"/>
           </a:p>
@@ -660,7 +710,7 @@
           <a:p>
             <a:fld id="{D999196E-D4C6-4B69-A492-D961CA2AEF86}" type="datetimeFigureOut">
               <a:rPr lang="de-DE" smtClean="0"/>
-              <a:t>18.03.2025</a:t>
+              <a:t>19.03.2025</a:t>
             </a:fld>
             <a:endParaRPr lang="de-DE"/>
           </a:p>
@@ -858,7 +908,7 @@
           <a:p>
             <a:fld id="{D999196E-D4C6-4B69-A492-D961CA2AEF86}" type="datetimeFigureOut">
               <a:rPr lang="de-DE" smtClean="0"/>
-              <a:t>18.03.2025</a:t>
+              <a:t>19.03.2025</a:t>
             </a:fld>
             <a:endParaRPr lang="de-DE"/>
           </a:p>
@@ -1133,7 +1183,7 @@
           <a:p>
             <a:fld id="{D999196E-D4C6-4B69-A492-D961CA2AEF86}" type="datetimeFigureOut">
               <a:rPr lang="de-DE" smtClean="0"/>
-              <a:t>18.03.2025</a:t>
+              <a:t>19.03.2025</a:t>
             </a:fld>
             <a:endParaRPr lang="de-DE"/>
           </a:p>
@@ -1398,7 +1448,7 @@
           <a:p>
             <a:fld id="{D999196E-D4C6-4B69-A492-D961CA2AEF86}" type="datetimeFigureOut">
               <a:rPr lang="de-DE" smtClean="0"/>
-              <a:t>18.03.2025</a:t>
+              <a:t>19.03.2025</a:t>
             </a:fld>
             <a:endParaRPr lang="de-DE"/>
           </a:p>
@@ -1810,7 +1860,7 @@
           <a:p>
             <a:fld id="{D999196E-D4C6-4B69-A492-D961CA2AEF86}" type="datetimeFigureOut">
               <a:rPr lang="de-DE" smtClean="0"/>
-              <a:t>18.03.2025</a:t>
+              <a:t>19.03.2025</a:t>
             </a:fld>
             <a:endParaRPr lang="de-DE"/>
           </a:p>
@@ -1951,7 +2001,7 @@
           <a:p>
             <a:fld id="{D999196E-D4C6-4B69-A492-D961CA2AEF86}" type="datetimeFigureOut">
               <a:rPr lang="de-DE" smtClean="0"/>
-              <a:t>18.03.2025</a:t>
+              <a:t>19.03.2025</a:t>
             </a:fld>
             <a:endParaRPr lang="de-DE"/>
           </a:p>
@@ -2064,7 +2114,7 @@
           <a:p>
             <a:fld id="{D999196E-D4C6-4B69-A492-D961CA2AEF86}" type="datetimeFigureOut">
               <a:rPr lang="de-DE" smtClean="0"/>
-              <a:t>18.03.2025</a:t>
+              <a:t>19.03.2025</a:t>
             </a:fld>
             <a:endParaRPr lang="de-DE"/>
           </a:p>
@@ -2375,7 +2425,7 @@
           <a:p>
             <a:fld id="{D999196E-D4C6-4B69-A492-D961CA2AEF86}" type="datetimeFigureOut">
               <a:rPr lang="de-DE" smtClean="0"/>
-              <a:t>18.03.2025</a:t>
+              <a:t>19.03.2025</a:t>
             </a:fld>
             <a:endParaRPr lang="de-DE"/>
           </a:p>
@@ -2663,7 +2713,7 @@
           <a:p>
             <a:fld id="{D999196E-D4C6-4B69-A492-D961CA2AEF86}" type="datetimeFigureOut">
               <a:rPr lang="de-DE" smtClean="0"/>
-              <a:t>18.03.2025</a:t>
+              <a:t>19.03.2025</a:t>
             </a:fld>
             <a:endParaRPr lang="de-DE"/>
           </a:p>
@@ -2904,7 +2954,7 @@
           <a:p>
             <a:fld id="{D999196E-D4C6-4B69-A492-D961CA2AEF86}" type="datetimeFigureOut">
               <a:rPr lang="de-DE" smtClean="0"/>
-              <a:t>18.03.2025</a:t>
+              <a:t>19.03.2025</a:t>
             </a:fld>
             <a:endParaRPr lang="de-DE"/>
           </a:p>
@@ -3335,8 +3385,8 @@
         </p:nvSpPr>
         <p:spPr>
           <a:xfrm>
-            <a:off x="690996" y="1631373"/>
-            <a:ext cx="3112078" cy="1200329"/>
+            <a:off x="684556" y="1213687"/>
+            <a:ext cx="3112078" cy="1477328"/>
           </a:xfrm>
           <a:prstGeom prst="rect">
             <a:avLst/>
@@ -3355,6 +3405,10 @@
           <a:lstStyle/>
           <a:p>
             <a:pPr algn="ctr"/>
+            <a:endParaRPr lang="de-DE" b="1" dirty="0"/>
+          </a:p>
+          <a:p>
+            <a:pPr algn="ctr"/>
             <a:r>
               <a:rPr lang="de-DE" b="1" dirty="0" err="1"/>
               <a:t>Cognitive</a:t>
@@ -3433,8 +3487,8 @@
         </p:nvSpPr>
         <p:spPr>
           <a:xfrm>
-            <a:off x="3950276" y="2828835"/>
-            <a:ext cx="3112078" cy="1200329"/>
+            <a:off x="3516091" y="2412660"/>
+            <a:ext cx="4777904" cy="1754326"/>
           </a:xfrm>
           <a:prstGeom prst="rect">
             <a:avLst/>
@@ -3453,6 +3507,10 @@
           <a:lstStyle/>
           <a:p>
             <a:pPr algn="ctr"/>
+            <a:endParaRPr lang="de-DE" b="1" dirty="0"/>
+          </a:p>
+          <a:p>
+            <a:pPr algn="ctr"/>
             <a:r>
               <a:rPr lang="de-DE" b="1" dirty="0"/>
               <a:t>Professional Vision</a:t>
@@ -3468,7 +3526,34 @@
               <a:rPr lang="de-DE" dirty="0" err="1"/>
               <a:t>efficiency</a:t>
             </a:r>
-            <a:endParaRPr lang="de-DE" dirty="0"/>
+            <a:r>
+              <a:rPr lang="de-DE" dirty="0"/>
+              <a:t>: </a:t>
+            </a:r>
+            <a:r>
+              <a:rPr lang="de-DE" dirty="0" err="1"/>
+              <a:t>monitoring</a:t>
+            </a:r>
+            <a:r>
+              <a:rPr lang="de-DE" dirty="0"/>
+              <a:t> </a:t>
+            </a:r>
+            <a:r>
+              <a:rPr lang="de-DE" dirty="0" err="1"/>
+              <a:t>the</a:t>
+            </a:r>
+            <a:r>
+              <a:rPr lang="de-DE" dirty="0"/>
+              <a:t> </a:t>
+            </a:r>
+            <a:r>
+              <a:rPr lang="de-DE" dirty="0" err="1"/>
+              <a:t>classroom</a:t>
+            </a:r>
+            <a:r>
+              <a:rPr lang="de-DE" dirty="0"/>
+              <a:t> </a:t>
+            </a:r>
           </a:p>
           <a:p>
             <a:pPr algn="ctr"/>
@@ -3486,6 +3571,10 @@
             </a:r>
             <a:endParaRPr lang="de-DE" dirty="0"/>
           </a:p>
+          <a:p>
+            <a:pPr algn="ctr"/>
+            <a:endParaRPr lang="de-DE" dirty="0"/>
+          </a:p>
         </p:txBody>
       </p:sp>
       <p:sp>
@@ -3502,8 +3591,8 @@
         </p:nvSpPr>
         <p:spPr>
           <a:xfrm>
-            <a:off x="7256316" y="4029164"/>
-            <a:ext cx="3112078" cy="1200329"/>
+            <a:off x="8059560" y="3833594"/>
+            <a:ext cx="3112078" cy="1477328"/>
           </a:xfrm>
           <a:prstGeom prst="rect">
             <a:avLst/>
@@ -3522,6 +3611,10 @@
           <a:lstStyle/>
           <a:p>
             <a:pPr algn="ctr"/>
+            <a:endParaRPr lang="de-DE" b="1" dirty="0"/>
+          </a:p>
+          <a:p>
+            <a:pPr algn="ctr"/>
             <a:r>
               <a:rPr lang="de-DE" b="1" dirty="0"/>
               <a:t>Observable </a:t>
@@ -3536,29 +3629,33 @@
             <a:pPr algn="ctr"/>
             <a:r>
               <a:rPr lang="de-DE" dirty="0"/>
-              <a:t>Gaze </a:t>
+              <a:t>e.g., </a:t>
             </a:r>
             <a:r>
               <a:rPr lang="de-DE" dirty="0" err="1"/>
-              <a:t>efficiency</a:t>
+              <a:t>managing</a:t>
+            </a:r>
+            <a:r>
+              <a:rPr lang="de-DE" dirty="0"/>
+              <a:t> </a:t>
+            </a:r>
+            <a:r>
+              <a:rPr lang="de-DE" dirty="0" err="1"/>
+              <a:t>classroom</a:t>
+            </a:r>
+            <a:r>
+              <a:rPr lang="de-DE" dirty="0"/>
+              <a:t> </a:t>
+            </a:r>
+            <a:r>
+              <a:rPr lang="de-DE" dirty="0" err="1"/>
+              <a:t>disruptions</a:t>
             </a:r>
             <a:endParaRPr lang="de-DE" dirty="0"/>
           </a:p>
           <a:p>
             <a:pPr algn="ctr"/>
-            <a:r>
-              <a:rPr lang="de-DE" dirty="0" err="1"/>
-              <a:t>Noticing</a:t>
-            </a:r>
-            <a:endParaRPr lang="de-DE" dirty="0"/>
-          </a:p>
-          <a:p>
-            <a:pPr algn="ctr"/>
-            <a:r>
-              <a:rPr lang="de-DE" dirty="0" err="1"/>
-              <a:t>Reasoning</a:t>
-            </a:r>
-            <a:endParaRPr lang="de-DE" dirty="0"/>
+            <a:endParaRPr lang="de-DE" b="1" dirty="0"/>
           </a:p>
         </p:txBody>
       </p:sp>

</xml_diff>

<commit_message>
classroom disruption management development modell erweitert
</commit_message>
<xml_diff>
--- a/02_paper/02_study/02_expertise_paper/pictures/Professional_Competence_Model.pptx
+++ b/02_paper/02_study/02_expertise_paper/pictures/Professional_Competence_Model.pptx
@@ -117,18 +117,18 @@
   <pc:docChgLst>
     <pc:chgData name="Mandy Klatt" userId="505858402c07da9d" providerId="LiveId" clId="{FA5EC466-BD05-4DCC-91DA-EA1E98BFA00F}"/>
     <pc:docChg chg="undo custSel modSld">
-      <pc:chgData name="Mandy Klatt" userId="505858402c07da9d" providerId="LiveId" clId="{FA5EC466-BD05-4DCC-91DA-EA1E98BFA00F}" dt="2025-03-24T13:06:57.664" v="309" actId="1076"/>
+      <pc:chgData name="Mandy Klatt" userId="505858402c07da9d" providerId="LiveId" clId="{FA5EC466-BD05-4DCC-91DA-EA1E98BFA00F}" dt="2025-03-26T12:28:43.767" v="335" actId="207"/>
       <pc:docMkLst>
         <pc:docMk/>
       </pc:docMkLst>
       <pc:sldChg chg="addSp delSp modSp mod">
-        <pc:chgData name="Mandy Klatt" userId="505858402c07da9d" providerId="LiveId" clId="{FA5EC466-BD05-4DCC-91DA-EA1E98BFA00F}" dt="2025-03-24T13:06:57.664" v="309" actId="1076"/>
+        <pc:chgData name="Mandy Klatt" userId="505858402c07da9d" providerId="LiveId" clId="{FA5EC466-BD05-4DCC-91DA-EA1E98BFA00F}" dt="2025-03-26T12:28:43.767" v="335" actId="207"/>
         <pc:sldMkLst>
           <pc:docMk/>
           <pc:sldMk cId="387449015" sldId="256"/>
         </pc:sldMkLst>
         <pc:spChg chg="mod">
-          <ac:chgData name="Mandy Klatt" userId="505858402c07da9d" providerId="LiveId" clId="{FA5EC466-BD05-4DCC-91DA-EA1E98BFA00F}" dt="2025-03-24T13:06:28.247" v="303" actId="1076"/>
+          <ac:chgData name="Mandy Klatt" userId="505858402c07da9d" providerId="LiveId" clId="{FA5EC466-BD05-4DCC-91DA-EA1E98BFA00F}" dt="2025-03-26T12:28:37.400" v="333" actId="207"/>
           <ac:spMkLst>
             <pc:docMk/>
             <pc:sldMk cId="387449015" sldId="256"/>
@@ -136,7 +136,7 @@
           </ac:spMkLst>
         </pc:spChg>
         <pc:spChg chg="mod">
-          <ac:chgData name="Mandy Klatt" userId="505858402c07da9d" providerId="LiveId" clId="{FA5EC466-BD05-4DCC-91DA-EA1E98BFA00F}" dt="2025-03-24T13:06:52.913" v="308" actId="1076"/>
+          <ac:chgData name="Mandy Klatt" userId="505858402c07da9d" providerId="LiveId" clId="{FA5EC466-BD05-4DCC-91DA-EA1E98BFA00F}" dt="2025-03-26T12:28:40.609" v="334" actId="207"/>
           <ac:spMkLst>
             <pc:docMk/>
             <pc:sldMk cId="387449015" sldId="256"/>
@@ -144,7 +144,7 @@
           </ac:spMkLst>
         </pc:spChg>
         <pc:spChg chg="mod">
-          <ac:chgData name="Mandy Klatt" userId="505858402c07da9d" providerId="LiveId" clId="{FA5EC466-BD05-4DCC-91DA-EA1E98BFA00F}" dt="2025-03-24T13:06:47.706" v="307" actId="1076"/>
+          <ac:chgData name="Mandy Klatt" userId="505858402c07da9d" providerId="LiveId" clId="{FA5EC466-BD05-4DCC-91DA-EA1E98BFA00F}" dt="2025-03-26T12:28:43.767" v="335" actId="207"/>
           <ac:spMkLst>
             <pc:docMk/>
             <pc:sldMk cId="387449015" sldId="256"/>
@@ -165,6 +165,14 @@
             <pc:docMk/>
             <pc:sldMk cId="387449015" sldId="256"/>
             <ac:cxnSpMk id="7" creationId="{CFC09584-40F0-4359-85BF-BED638B77E1A}"/>
+          </ac:cxnSpMkLst>
+        </pc:cxnChg>
+        <pc:cxnChg chg="add mod">
+          <ac:chgData name="Mandy Klatt" userId="505858402c07da9d" providerId="LiveId" clId="{FA5EC466-BD05-4DCC-91DA-EA1E98BFA00F}" dt="2025-03-26T12:28:20.684" v="332" actId="1076"/>
+          <ac:cxnSpMkLst>
+            <pc:docMk/>
+            <pc:sldMk cId="387449015" sldId="256"/>
+            <ac:cxnSpMk id="9" creationId="{D01F001F-3961-4BCD-99E7-F51216A2D0E5}"/>
           </ac:cxnSpMkLst>
         </pc:cxnChg>
         <pc:cxnChg chg="add del mod">
@@ -208,15 +216,15 @@
           </ac:cxnSpMkLst>
         </pc:cxnChg>
         <pc:cxnChg chg="add mod">
-          <ac:chgData name="Mandy Klatt" userId="505858402c07da9d" providerId="LiveId" clId="{FA5EC466-BD05-4DCC-91DA-EA1E98BFA00F}" dt="2025-03-24T13:06:31.457" v="304" actId="1076"/>
+          <ac:chgData name="Mandy Klatt" userId="505858402c07da9d" providerId="LiveId" clId="{FA5EC466-BD05-4DCC-91DA-EA1E98BFA00F}" dt="2025-03-26T12:27:41.285" v="325" actId="14100"/>
           <ac:cxnSpMkLst>
             <pc:docMk/>
             <pc:sldMk cId="387449015" sldId="256"/>
             <ac:cxnSpMk id="29" creationId="{691D8F75-3E6C-426C-A972-68EC3E3D4541}"/>
           </ac:cxnSpMkLst>
         </pc:cxnChg>
-        <pc:cxnChg chg="add mod">
-          <ac:chgData name="Mandy Klatt" userId="505858402c07da9d" providerId="LiveId" clId="{FA5EC466-BD05-4DCC-91DA-EA1E98BFA00F}" dt="2025-03-24T13:06:57.664" v="309" actId="1076"/>
+        <pc:cxnChg chg="add del mod">
+          <ac:chgData name="Mandy Klatt" userId="505858402c07da9d" providerId="LiveId" clId="{FA5EC466-BD05-4DCC-91DA-EA1E98BFA00F}" dt="2025-03-26T12:28:07.974" v="330" actId="478"/>
           <ac:cxnSpMkLst>
             <pc:docMk/>
             <pc:sldMk cId="387449015" sldId="256"/>
@@ -376,7 +384,7 @@
           <a:p>
             <a:fld id="{D999196E-D4C6-4B69-A492-D961CA2AEF86}" type="datetimeFigureOut">
               <a:rPr lang="de-DE" smtClean="0"/>
-              <a:t>24.03.2025</a:t>
+              <a:t>26.03.2025</a:t>
             </a:fld>
             <a:endParaRPr lang="de-DE"/>
           </a:p>
@@ -574,7 +582,7 @@
           <a:p>
             <a:fld id="{D999196E-D4C6-4B69-A492-D961CA2AEF86}" type="datetimeFigureOut">
               <a:rPr lang="de-DE" smtClean="0"/>
-              <a:t>24.03.2025</a:t>
+              <a:t>26.03.2025</a:t>
             </a:fld>
             <a:endParaRPr lang="de-DE"/>
           </a:p>
@@ -782,7 +790,7 @@
           <a:p>
             <a:fld id="{D999196E-D4C6-4B69-A492-D961CA2AEF86}" type="datetimeFigureOut">
               <a:rPr lang="de-DE" smtClean="0"/>
-              <a:t>24.03.2025</a:t>
+              <a:t>26.03.2025</a:t>
             </a:fld>
             <a:endParaRPr lang="de-DE"/>
           </a:p>
@@ -980,7 +988,7 @@
           <a:p>
             <a:fld id="{D999196E-D4C6-4B69-A492-D961CA2AEF86}" type="datetimeFigureOut">
               <a:rPr lang="de-DE" smtClean="0"/>
-              <a:t>24.03.2025</a:t>
+              <a:t>26.03.2025</a:t>
             </a:fld>
             <a:endParaRPr lang="de-DE"/>
           </a:p>
@@ -1255,7 +1263,7 @@
           <a:p>
             <a:fld id="{D999196E-D4C6-4B69-A492-D961CA2AEF86}" type="datetimeFigureOut">
               <a:rPr lang="de-DE" smtClean="0"/>
-              <a:t>24.03.2025</a:t>
+              <a:t>26.03.2025</a:t>
             </a:fld>
             <a:endParaRPr lang="de-DE"/>
           </a:p>
@@ -1520,7 +1528,7 @@
           <a:p>
             <a:fld id="{D999196E-D4C6-4B69-A492-D961CA2AEF86}" type="datetimeFigureOut">
               <a:rPr lang="de-DE" smtClean="0"/>
-              <a:t>24.03.2025</a:t>
+              <a:t>26.03.2025</a:t>
             </a:fld>
             <a:endParaRPr lang="de-DE"/>
           </a:p>
@@ -1932,7 +1940,7 @@
           <a:p>
             <a:fld id="{D999196E-D4C6-4B69-A492-D961CA2AEF86}" type="datetimeFigureOut">
               <a:rPr lang="de-DE" smtClean="0"/>
-              <a:t>24.03.2025</a:t>
+              <a:t>26.03.2025</a:t>
             </a:fld>
             <a:endParaRPr lang="de-DE"/>
           </a:p>
@@ -2073,7 +2081,7 @@
           <a:p>
             <a:fld id="{D999196E-D4C6-4B69-A492-D961CA2AEF86}" type="datetimeFigureOut">
               <a:rPr lang="de-DE" smtClean="0"/>
-              <a:t>24.03.2025</a:t>
+              <a:t>26.03.2025</a:t>
             </a:fld>
             <a:endParaRPr lang="de-DE"/>
           </a:p>
@@ -2186,7 +2194,7 @@
           <a:p>
             <a:fld id="{D999196E-D4C6-4B69-A492-D961CA2AEF86}" type="datetimeFigureOut">
               <a:rPr lang="de-DE" smtClean="0"/>
-              <a:t>24.03.2025</a:t>
+              <a:t>26.03.2025</a:t>
             </a:fld>
             <a:endParaRPr lang="de-DE"/>
           </a:p>
@@ -2497,7 +2505,7 @@
           <a:p>
             <a:fld id="{D999196E-D4C6-4B69-A492-D961CA2AEF86}" type="datetimeFigureOut">
               <a:rPr lang="de-DE" smtClean="0"/>
-              <a:t>24.03.2025</a:t>
+              <a:t>26.03.2025</a:t>
             </a:fld>
             <a:endParaRPr lang="de-DE"/>
           </a:p>
@@ -2785,7 +2793,7 @@
           <a:p>
             <a:fld id="{D999196E-D4C6-4B69-A492-D961CA2AEF86}" type="datetimeFigureOut">
               <a:rPr lang="de-DE" smtClean="0"/>
-              <a:t>24.03.2025</a:t>
+              <a:t>26.03.2025</a:t>
             </a:fld>
             <a:endParaRPr lang="de-DE"/>
           </a:p>
@@ -3026,7 +3034,7 @@
           <a:p>
             <a:fld id="{D999196E-D4C6-4B69-A492-D961CA2AEF86}" type="datetimeFigureOut">
               <a:rPr lang="de-DE" smtClean="0"/>
-              <a:t>24.03.2025</a:t>
+              <a:t>26.03.2025</a:t>
             </a:fld>
             <a:endParaRPr lang="de-DE"/>
           </a:p>
@@ -3463,7 +3471,9 @@
           <a:prstGeom prst="rect">
             <a:avLst/>
           </a:prstGeom>
-          <a:noFill/>
+          <a:solidFill>
+            <a:schemeClr val="bg2"/>
+          </a:solidFill>
           <a:ln>
             <a:solidFill>
               <a:schemeClr val="tx1"/>
@@ -3559,13 +3569,15 @@
         </p:nvSpPr>
         <p:spPr>
           <a:xfrm>
-            <a:off x="2476767" y="2549180"/>
+            <a:off x="2283727" y="2491117"/>
             <a:ext cx="6284233" cy="2123658"/>
           </a:xfrm>
           <a:prstGeom prst="rect">
             <a:avLst/>
           </a:prstGeom>
-          <a:noFill/>
+          <a:solidFill>
+            <a:schemeClr val="bg2"/>
+          </a:solidFill>
           <a:ln>
             <a:solidFill>
               <a:schemeClr val="tx1"/>
@@ -3702,7 +3714,9 @@
           <a:prstGeom prst="rect">
             <a:avLst/>
           </a:prstGeom>
-          <a:noFill/>
+          <a:solidFill>
+            <a:schemeClr val="bg2"/>
+          </a:solidFill>
           <a:ln>
             <a:solidFill>
               <a:schemeClr val="tx1"/>
@@ -3773,13 +3787,15 @@
               </a:ext>
             </a:extLst>
           </p:cNvPr>
-          <p:cNvCxnSpPr/>
+          <p:cNvCxnSpPr>
+            <a:cxnSpLocks/>
+          </p:cNvCxnSpPr>
           <p:nvPr/>
         </p:nvCxnSpPr>
         <p:spPr>
           <a:xfrm>
-            <a:off x="4936259" y="1657966"/>
-            <a:ext cx="1365250" cy="807751"/>
+            <a:off x="4772025" y="1384816"/>
+            <a:ext cx="1837055" cy="1106301"/>
           </a:xfrm>
           <a:prstGeom prst="straightConnector1">
             <a:avLst/>
@@ -3806,25 +3822,28 @@
       </p:cxnSp>
       <p:cxnSp>
         <p:nvCxnSpPr>
-          <p:cNvPr id="30" name="Gerade Verbindung mit Pfeil 29">
-            <a:extLst>
-              <a:ext uri="{FF2B5EF4-FFF2-40B4-BE49-F238E27FC236}">
-                <a16:creationId xmlns:a16="http://schemas.microsoft.com/office/drawing/2014/main" id="{2A7F053A-6E4B-4653-ACBB-0F27BE29A507}"/>
-              </a:ext>
-            </a:extLst>
-          </p:cNvPr>
-          <p:cNvCxnSpPr/>
+          <p:cNvPr id="9" name="Gerade Verbindung mit Pfeil 8">
+            <a:extLst>
+              <a:ext uri="{FF2B5EF4-FFF2-40B4-BE49-F238E27FC236}">
+                <a16:creationId xmlns:a16="http://schemas.microsoft.com/office/drawing/2014/main" id="{D01F001F-3961-4BCD-99E7-F51216A2D0E5}"/>
+              </a:ext>
+            </a:extLst>
+          </p:cNvPr>
+          <p:cNvCxnSpPr>
+            <a:cxnSpLocks/>
+          </p:cNvCxnSpPr>
           <p:nvPr/>
         </p:nvCxnSpPr>
         <p:spPr>
           <a:xfrm>
-            <a:off x="8948882" y="3985330"/>
-            <a:ext cx="1365250" cy="807751"/>
+            <a:off x="8567960" y="3807024"/>
+            <a:ext cx="1837055" cy="1106301"/>
           </a:xfrm>
           <a:prstGeom prst="straightConnector1">
             <a:avLst/>
           </a:prstGeom>
           <a:ln w="19050">
+            <a:prstDash val="solid"/>
             <a:tailEnd type="triangle"/>
           </a:ln>
         </p:spPr>

</xml_diff>

<commit_message>
annes kommentare eingearbeitet (intro, disruptions, management, bis seite 6) + modell erneuert
</commit_message>
<xml_diff>
--- a/02_paper/02_study/02_expertise_paper/pictures/Professional_Competence_Model.pptx
+++ b/02_paper/02_study/02_expertise_paper/pictures/Professional_Competence_Model.pptx
@@ -116,19 +116,19 @@
 <pc:chgInfo xmlns:a="http://schemas.openxmlformats.org/drawingml/2006/main" xmlns:r="http://schemas.openxmlformats.org/officeDocument/2006/relationships" xmlns:ac="http://schemas.microsoft.com/office/drawing/2013/main/command" xmlns:pc="http://schemas.microsoft.com/office/powerpoint/2013/main/command">
   <pc:docChgLst>
     <pc:chgData name="Mandy Klatt" userId="505858402c07da9d" providerId="LiveId" clId="{FA5EC466-BD05-4DCC-91DA-EA1E98BFA00F}"/>
-    <pc:docChg chg="undo custSel modSld">
-      <pc:chgData name="Mandy Klatt" userId="505858402c07da9d" providerId="LiveId" clId="{FA5EC466-BD05-4DCC-91DA-EA1E98BFA00F}" dt="2025-03-26T12:28:43.767" v="335" actId="207"/>
+    <pc:docChg chg="undo redo custSel modSld">
+      <pc:chgData name="Mandy Klatt" userId="505858402c07da9d" providerId="LiveId" clId="{FA5EC466-BD05-4DCC-91DA-EA1E98BFA00F}" dt="2025-04-02T13:49:20.058" v="408" actId="20577"/>
       <pc:docMkLst>
         <pc:docMk/>
       </pc:docMkLst>
       <pc:sldChg chg="addSp delSp modSp mod">
-        <pc:chgData name="Mandy Klatt" userId="505858402c07da9d" providerId="LiveId" clId="{FA5EC466-BD05-4DCC-91DA-EA1E98BFA00F}" dt="2025-03-26T12:28:43.767" v="335" actId="207"/>
+        <pc:chgData name="Mandy Klatt" userId="505858402c07da9d" providerId="LiveId" clId="{FA5EC466-BD05-4DCC-91DA-EA1E98BFA00F}" dt="2025-04-02T13:49:20.058" v="408" actId="20577"/>
         <pc:sldMkLst>
           <pc:docMk/>
           <pc:sldMk cId="387449015" sldId="256"/>
         </pc:sldMkLst>
         <pc:spChg chg="mod">
-          <ac:chgData name="Mandy Klatt" userId="505858402c07da9d" providerId="LiveId" clId="{FA5EC466-BD05-4DCC-91DA-EA1E98BFA00F}" dt="2025-03-26T12:28:37.400" v="333" actId="207"/>
+          <ac:chgData name="Mandy Klatt" userId="505858402c07da9d" providerId="LiveId" clId="{FA5EC466-BD05-4DCC-91DA-EA1E98BFA00F}" dt="2025-04-02T13:49:20.058" v="408" actId="20577"/>
           <ac:spMkLst>
             <pc:docMk/>
             <pc:sldMk cId="387449015" sldId="256"/>
@@ -136,7 +136,7 @@
           </ac:spMkLst>
         </pc:spChg>
         <pc:spChg chg="mod">
-          <ac:chgData name="Mandy Klatt" userId="505858402c07da9d" providerId="LiveId" clId="{FA5EC466-BD05-4DCC-91DA-EA1E98BFA00F}" dt="2025-03-26T12:28:40.609" v="334" actId="207"/>
+          <ac:chgData name="Mandy Klatt" userId="505858402c07da9d" providerId="LiveId" clId="{FA5EC466-BD05-4DCC-91DA-EA1E98BFA00F}" dt="2025-04-02T13:23:39.602" v="398" actId="1076"/>
           <ac:spMkLst>
             <pc:docMk/>
             <pc:sldMk cId="387449015" sldId="256"/>
@@ -144,13 +144,21 @@
           </ac:spMkLst>
         </pc:spChg>
         <pc:spChg chg="mod">
-          <ac:chgData name="Mandy Klatt" userId="505858402c07da9d" providerId="LiveId" clId="{FA5EC466-BD05-4DCC-91DA-EA1E98BFA00F}" dt="2025-03-26T12:28:43.767" v="335" actId="207"/>
+          <ac:chgData name="Mandy Klatt" userId="505858402c07da9d" providerId="LiveId" clId="{FA5EC466-BD05-4DCC-91DA-EA1E98BFA00F}" dt="2025-04-02T13:24:21.812" v="405" actId="1076"/>
           <ac:spMkLst>
             <pc:docMk/>
             <pc:sldMk cId="387449015" sldId="256"/>
             <ac:spMk id="6" creationId="{05BFDD83-8A7C-4409-9548-42B073B0C9D0}"/>
           </ac:spMkLst>
         </pc:spChg>
+        <pc:cxnChg chg="add mod">
+          <ac:chgData name="Mandy Klatt" userId="505858402c07da9d" providerId="LiveId" clId="{FA5EC466-BD05-4DCC-91DA-EA1E98BFA00F}" dt="2025-04-02T13:23:51.484" v="400" actId="1582"/>
+          <ac:cxnSpMkLst>
+            <pc:docMk/>
+            <pc:sldMk cId="387449015" sldId="256"/>
+            <ac:cxnSpMk id="3" creationId="{216E32AC-B9A8-46BE-AA08-F62B3DBD91D6}"/>
+          </ac:cxnSpMkLst>
+        </pc:cxnChg>
         <pc:cxnChg chg="add del mod">
           <ac:chgData name="Mandy Klatt" userId="505858402c07da9d" providerId="LiveId" clId="{FA5EC466-BD05-4DCC-91DA-EA1E98BFA00F}" dt="2025-03-24T12:58:55.685" v="228" actId="478"/>
           <ac:cxnSpMkLst>
@@ -167,12 +175,20 @@
             <ac:cxnSpMk id="7" creationId="{CFC09584-40F0-4359-85BF-BED638B77E1A}"/>
           </ac:cxnSpMkLst>
         </pc:cxnChg>
-        <pc:cxnChg chg="add mod">
-          <ac:chgData name="Mandy Klatt" userId="505858402c07da9d" providerId="LiveId" clId="{FA5EC466-BD05-4DCC-91DA-EA1E98BFA00F}" dt="2025-03-26T12:28:20.684" v="332" actId="1076"/>
+        <pc:cxnChg chg="add del mod">
+          <ac:chgData name="Mandy Klatt" userId="505858402c07da9d" providerId="LiveId" clId="{FA5EC466-BD05-4DCC-91DA-EA1E98BFA00F}" dt="2025-04-02T13:19:55.046" v="368" actId="478"/>
           <ac:cxnSpMkLst>
             <pc:docMk/>
             <pc:sldMk cId="387449015" sldId="256"/>
             <ac:cxnSpMk id="9" creationId="{D01F001F-3961-4BCD-99E7-F51216A2D0E5}"/>
+          </ac:cxnSpMkLst>
+        </pc:cxnChg>
+        <pc:cxnChg chg="add mod">
+          <ac:chgData name="Mandy Klatt" userId="505858402c07da9d" providerId="LiveId" clId="{FA5EC466-BD05-4DCC-91DA-EA1E98BFA00F}" dt="2025-04-02T13:24:21.812" v="405" actId="1076"/>
+          <ac:cxnSpMkLst>
+            <pc:docMk/>
+            <pc:sldMk cId="387449015" sldId="256"/>
+            <ac:cxnSpMk id="10" creationId="{78F39405-93C5-4D38-91E0-E6B47520F8AB}"/>
           </ac:cxnSpMkLst>
         </pc:cxnChg>
         <pc:cxnChg chg="add del mod">
@@ -215,8 +231,8 @@
             <ac:cxnSpMk id="26" creationId="{261718A8-3C11-42FC-BC2F-BF5440EF3615}"/>
           </ac:cxnSpMkLst>
         </pc:cxnChg>
-        <pc:cxnChg chg="add mod">
-          <ac:chgData name="Mandy Klatt" userId="505858402c07da9d" providerId="LiveId" clId="{FA5EC466-BD05-4DCC-91DA-EA1E98BFA00F}" dt="2025-03-26T12:27:41.285" v="325" actId="14100"/>
+        <pc:cxnChg chg="add del mod">
+          <ac:chgData name="Mandy Klatt" userId="505858402c07da9d" providerId="LiveId" clId="{FA5EC466-BD05-4DCC-91DA-EA1E98BFA00F}" dt="2025-04-02T13:19:51.560" v="367" actId="478"/>
           <ac:cxnSpMkLst>
             <pc:docMk/>
             <pc:sldMk cId="387449015" sldId="256"/>
@@ -384,7 +400,7 @@
           <a:p>
             <a:fld id="{D999196E-D4C6-4B69-A492-D961CA2AEF86}" type="datetimeFigureOut">
               <a:rPr lang="de-DE" smtClean="0"/>
-              <a:t>26.03.2025</a:t>
+              <a:t>02.04.2025</a:t>
             </a:fld>
             <a:endParaRPr lang="de-DE"/>
           </a:p>
@@ -582,7 +598,7 @@
           <a:p>
             <a:fld id="{D999196E-D4C6-4B69-A492-D961CA2AEF86}" type="datetimeFigureOut">
               <a:rPr lang="de-DE" smtClean="0"/>
-              <a:t>26.03.2025</a:t>
+              <a:t>02.04.2025</a:t>
             </a:fld>
             <a:endParaRPr lang="de-DE"/>
           </a:p>
@@ -790,7 +806,7 @@
           <a:p>
             <a:fld id="{D999196E-D4C6-4B69-A492-D961CA2AEF86}" type="datetimeFigureOut">
               <a:rPr lang="de-DE" smtClean="0"/>
-              <a:t>26.03.2025</a:t>
+              <a:t>02.04.2025</a:t>
             </a:fld>
             <a:endParaRPr lang="de-DE"/>
           </a:p>
@@ -988,7 +1004,7 @@
           <a:p>
             <a:fld id="{D999196E-D4C6-4B69-A492-D961CA2AEF86}" type="datetimeFigureOut">
               <a:rPr lang="de-DE" smtClean="0"/>
-              <a:t>26.03.2025</a:t>
+              <a:t>02.04.2025</a:t>
             </a:fld>
             <a:endParaRPr lang="de-DE"/>
           </a:p>
@@ -1263,7 +1279,7 @@
           <a:p>
             <a:fld id="{D999196E-D4C6-4B69-A492-D961CA2AEF86}" type="datetimeFigureOut">
               <a:rPr lang="de-DE" smtClean="0"/>
-              <a:t>26.03.2025</a:t>
+              <a:t>02.04.2025</a:t>
             </a:fld>
             <a:endParaRPr lang="de-DE"/>
           </a:p>
@@ -1528,7 +1544,7 @@
           <a:p>
             <a:fld id="{D999196E-D4C6-4B69-A492-D961CA2AEF86}" type="datetimeFigureOut">
               <a:rPr lang="de-DE" smtClean="0"/>
-              <a:t>26.03.2025</a:t>
+              <a:t>02.04.2025</a:t>
             </a:fld>
             <a:endParaRPr lang="de-DE"/>
           </a:p>
@@ -1940,7 +1956,7 @@
           <a:p>
             <a:fld id="{D999196E-D4C6-4B69-A492-D961CA2AEF86}" type="datetimeFigureOut">
               <a:rPr lang="de-DE" smtClean="0"/>
-              <a:t>26.03.2025</a:t>
+              <a:t>02.04.2025</a:t>
             </a:fld>
             <a:endParaRPr lang="de-DE"/>
           </a:p>
@@ -2081,7 +2097,7 @@
           <a:p>
             <a:fld id="{D999196E-D4C6-4B69-A492-D961CA2AEF86}" type="datetimeFigureOut">
               <a:rPr lang="de-DE" smtClean="0"/>
-              <a:t>26.03.2025</a:t>
+              <a:t>02.04.2025</a:t>
             </a:fld>
             <a:endParaRPr lang="de-DE"/>
           </a:p>
@@ -2194,7 +2210,7 @@
           <a:p>
             <a:fld id="{D999196E-D4C6-4B69-A492-D961CA2AEF86}" type="datetimeFigureOut">
               <a:rPr lang="de-DE" smtClean="0"/>
-              <a:t>26.03.2025</a:t>
+              <a:t>02.04.2025</a:t>
             </a:fld>
             <a:endParaRPr lang="de-DE"/>
           </a:p>
@@ -2505,7 +2521,7 @@
           <a:p>
             <a:fld id="{D999196E-D4C6-4B69-A492-D961CA2AEF86}" type="datetimeFigureOut">
               <a:rPr lang="de-DE" smtClean="0"/>
-              <a:t>26.03.2025</a:t>
+              <a:t>02.04.2025</a:t>
             </a:fld>
             <a:endParaRPr lang="de-DE"/>
           </a:p>
@@ -2793,7 +2809,7 @@
           <a:p>
             <a:fld id="{D999196E-D4C6-4B69-A492-D961CA2AEF86}" type="datetimeFigureOut">
               <a:rPr lang="de-DE" smtClean="0"/>
-              <a:t>26.03.2025</a:t>
+              <a:t>02.04.2025</a:t>
             </a:fld>
             <a:endParaRPr lang="de-DE"/>
           </a:p>
@@ -3034,7 +3050,7 @@
           <a:p>
             <a:fld id="{D999196E-D4C6-4B69-A492-D961CA2AEF86}" type="datetimeFigureOut">
               <a:rPr lang="de-DE" smtClean="0"/>
-              <a:t>26.03.2025</a:t>
+              <a:t>02.04.2025</a:t>
             </a:fld>
             <a:endParaRPr lang="de-DE"/>
           </a:p>
@@ -3465,10 +3481,10 @@
         </p:nvSpPr>
         <p:spPr>
           <a:xfrm>
-            <a:off x="369700" y="430837"/>
-            <a:ext cx="4402325" cy="1754326"/>
+            <a:off x="882649" y="1615825"/>
+            <a:ext cx="2402075" cy="2464058"/>
           </a:xfrm>
-          <a:prstGeom prst="rect">
+          <a:prstGeom prst="roundRect">
             <a:avLst/>
           </a:prstGeom>
           <a:solidFill>
@@ -3492,62 +3508,53 @@
           <a:p>
             <a:pPr algn="ctr"/>
             <a:r>
-              <a:rPr lang="de-DE" sz="2400" b="1" dirty="0" err="1"/>
-              <a:t>Cognitive</a:t>
-            </a:r>
-            <a:r>
               <a:rPr lang="de-DE" sz="2400" b="1" dirty="0"/>
+              <a:t>Knowledge</a:t>
+            </a:r>
+          </a:p>
+          <a:p>
+            <a:pPr algn="ctr"/>
+            <a:r>
+              <a:rPr lang="de-DE" sz="2000" dirty="0"/>
+              <a:t>e.g., </a:t>
+            </a:r>
+            <a:r>
+              <a:rPr lang="de-DE" sz="2000" dirty="0" err="1"/>
+              <a:t>strategic</a:t>
+            </a:r>
+            <a:r>
+              <a:rPr lang="de-DE" sz="2000" dirty="0"/>
               <a:t> </a:t>
             </a:r>
             <a:r>
-              <a:rPr lang="de-DE" sz="2400" b="1" dirty="0" err="1"/>
-              <a:t>dispositions</a:t>
-            </a:r>
-            <a:endParaRPr lang="de-DE" sz="2400" b="1" dirty="0"/>
-          </a:p>
-          <a:p>
-            <a:pPr algn="ctr"/>
-            <a:r>
-              <a:rPr lang="de-DE" sz="2400" dirty="0"/>
-              <a:t>e.g., </a:t>
-            </a:r>
-            <a:r>
-              <a:rPr lang="de-DE" sz="2400" dirty="0" err="1"/>
-              <a:t>strategic</a:t>
-            </a:r>
-            <a:r>
-              <a:rPr lang="de-DE" sz="2400" dirty="0"/>
+              <a:rPr lang="de-DE" sz="2000" dirty="0" err="1"/>
+              <a:t>knowledge</a:t>
+            </a:r>
+            <a:r>
+              <a:rPr lang="de-DE" sz="2000" dirty="0"/>
               <a:t> </a:t>
             </a:r>
             <a:r>
-              <a:rPr lang="de-DE" sz="2400" dirty="0" err="1"/>
-              <a:t>knowledge</a:t>
-            </a:r>
-            <a:r>
-              <a:rPr lang="de-DE" sz="2400" dirty="0"/>
+              <a:rPr lang="de-DE" sz="2000" dirty="0" err="1"/>
+              <a:t>about</a:t>
+            </a:r>
+            <a:r>
+              <a:rPr lang="de-DE" sz="2000" dirty="0"/>
               <a:t> </a:t>
             </a:r>
             <a:r>
-              <a:rPr lang="de-DE" sz="2400" dirty="0" err="1"/>
-              <a:t>about</a:t>
-            </a:r>
-            <a:r>
-              <a:rPr lang="de-DE" sz="2400" dirty="0"/>
+              <a:rPr lang="de-DE" sz="2000" dirty="0" err="1"/>
+              <a:t>classroom</a:t>
+            </a:r>
+            <a:r>
+              <a:rPr lang="de-DE" sz="2000" dirty="0"/>
               <a:t> </a:t>
             </a:r>
             <a:r>
-              <a:rPr lang="de-DE" sz="2400" dirty="0" err="1"/>
-              <a:t>classroom</a:t>
-            </a:r>
-            <a:r>
-              <a:rPr lang="de-DE" sz="2400" dirty="0"/>
-              <a:t> </a:t>
-            </a:r>
-            <a:r>
-              <a:rPr lang="de-DE" sz="2400" dirty="0" err="1"/>
+              <a:rPr lang="de-DE" sz="2000" dirty="0" err="1"/>
               <a:t>management</a:t>
             </a:r>
-            <a:endParaRPr lang="de-DE" sz="2400" dirty="0"/>
+            <a:endParaRPr lang="de-DE" sz="2000" dirty="0"/>
           </a:p>
           <a:p>
             <a:pPr algn="ctr"/>
@@ -3569,10 +3576,10 @@
         </p:nvSpPr>
         <p:spPr>
           <a:xfrm>
-            <a:off x="2283727" y="2491117"/>
-            <a:ext cx="6284233" cy="2123658"/>
+            <a:off x="4126328" y="1775220"/>
+            <a:ext cx="4331872" cy="2145268"/>
           </a:xfrm>
-          <a:prstGeom prst="rect">
+          <a:prstGeom prst="roundRect">
             <a:avLst/>
           </a:prstGeom>
           <a:solidFill>
@@ -3608,85 +3615,69 @@
           <a:p>
             <a:pPr algn="ctr"/>
             <a:r>
-              <a:rPr lang="de-DE" sz="2400" dirty="0" err="1"/>
+              <a:rPr lang="de-DE" sz="2000" dirty="0" err="1"/>
+              <a:t>visual</a:t>
+            </a:r>
+            <a:r>
+              <a:rPr lang="de-DE" sz="2000" dirty="0"/>
+              <a:t> </a:t>
+            </a:r>
+            <a:r>
+              <a:rPr lang="de-DE" sz="2000" dirty="0" err="1"/>
+              <a:t>scanning</a:t>
+            </a:r>
+            <a:r>
+              <a:rPr lang="de-DE" sz="2000" dirty="0"/>
+              <a:t> (</a:t>
+            </a:r>
+            <a:r>
+              <a:rPr lang="de-DE" sz="2000" dirty="0" err="1"/>
               <a:t>gaze</a:t>
             </a:r>
             <a:r>
-              <a:rPr lang="de-DE" sz="2400" dirty="0"/>
+              <a:rPr lang="de-DE" sz="2000" dirty="0"/>
               <a:t> </a:t>
             </a:r>
             <a:r>
-              <a:rPr lang="de-DE" sz="2400" dirty="0" err="1"/>
+              <a:rPr lang="de-DE" sz="2000" dirty="0" err="1"/>
               <a:t>efficiency</a:t>
             </a:r>
             <a:r>
-              <a:rPr lang="de-DE" sz="2400" dirty="0"/>
-              <a:t>: </a:t>
-            </a:r>
-            <a:r>
-              <a:rPr lang="de-DE" sz="2400" dirty="0" err="1"/>
-              <a:t>globally</a:t>
-            </a:r>
-            <a:r>
-              <a:rPr lang="de-DE" sz="2400" dirty="0"/>
+              <a:rPr lang="de-DE" sz="2000" dirty="0"/>
+              <a:t>)</a:t>
+            </a:r>
+          </a:p>
+          <a:p>
+            <a:pPr algn="ctr"/>
+            <a:r>
+              <a:rPr lang="de-DE" sz="2000" dirty="0" err="1"/>
+              <a:t>knowledge-based</a:t>
+            </a:r>
+            <a:r>
+              <a:rPr lang="de-DE" sz="2000" dirty="0"/>
               <a:t> </a:t>
             </a:r>
             <a:r>
-              <a:rPr lang="de-DE" sz="2400" dirty="0" err="1"/>
-              <a:t>scanning</a:t>
-            </a:r>
-            <a:r>
-              <a:rPr lang="de-DE" sz="2400" dirty="0"/>
+              <a:rPr lang="de-DE" sz="2000" dirty="0" err="1"/>
+              <a:t>noticing</a:t>
+            </a:r>
+            <a:endParaRPr lang="de-DE" sz="2000" dirty="0"/>
+          </a:p>
+          <a:p>
+            <a:pPr algn="ctr"/>
+            <a:r>
+              <a:rPr lang="de-DE" sz="2000" dirty="0" err="1"/>
+              <a:t>knowledge-based</a:t>
+            </a:r>
+            <a:r>
+              <a:rPr lang="de-DE" sz="2000" dirty="0"/>
               <a:t> </a:t>
             </a:r>
             <a:r>
-              <a:rPr lang="de-DE" sz="2400" dirty="0" err="1"/>
-              <a:t>the</a:t>
-            </a:r>
-            <a:r>
-              <a:rPr lang="de-DE" sz="2400" dirty="0"/>
-              <a:t> </a:t>
-            </a:r>
-            <a:r>
-              <a:rPr lang="de-DE" sz="2400" dirty="0" err="1"/>
-              <a:t>classroom</a:t>
-            </a:r>
-            <a:r>
-              <a:rPr lang="de-DE" sz="2400" dirty="0"/>
-              <a:t> </a:t>
-            </a:r>
-          </a:p>
-          <a:p>
-            <a:pPr algn="ctr"/>
-            <a:r>
-              <a:rPr lang="de-DE" sz="2400" dirty="0" err="1"/>
-              <a:t>knowledge-based</a:t>
-            </a:r>
-            <a:r>
-              <a:rPr lang="de-DE" sz="2400" dirty="0"/>
-              <a:t> </a:t>
-            </a:r>
-            <a:r>
-              <a:rPr lang="de-DE" sz="2400" dirty="0" err="1"/>
-              <a:t>noticing</a:t>
-            </a:r>
-            <a:endParaRPr lang="de-DE" sz="2400" dirty="0"/>
-          </a:p>
-          <a:p>
-            <a:pPr algn="ctr"/>
-            <a:r>
-              <a:rPr lang="de-DE" sz="2400" dirty="0" err="1"/>
-              <a:t>knowledge-based</a:t>
-            </a:r>
-            <a:r>
-              <a:rPr lang="de-DE" sz="2400" dirty="0"/>
-              <a:t> </a:t>
-            </a:r>
-            <a:r>
-              <a:rPr lang="de-DE" sz="2400" dirty="0" err="1"/>
+              <a:rPr lang="de-DE" sz="2000" dirty="0" err="1"/>
               <a:t>reasoning</a:t>
             </a:r>
-            <a:endParaRPr lang="de-DE" sz="2400" dirty="0"/>
+            <a:endParaRPr lang="de-DE" sz="2000" dirty="0"/>
           </a:p>
           <a:p>
             <a:pPr algn="ctr"/>
@@ -3708,10 +3699,10 @@
         </p:nvSpPr>
         <p:spPr>
           <a:xfrm>
-            <a:off x="7084825" y="4913325"/>
-            <a:ext cx="4397131" cy="1771266"/>
+            <a:off x="9299804" y="1582071"/>
+            <a:ext cx="2402075" cy="2531566"/>
           </a:xfrm>
-          <a:prstGeom prst="rect">
+          <a:prstGeom prst="roundRect">
             <a:avLst/>
           </a:prstGeom>
           <a:solidFill>
@@ -3747,30 +3738,30 @@
           <a:p>
             <a:pPr algn="ctr"/>
             <a:r>
-              <a:rPr lang="de-DE" sz="2400" dirty="0"/>
+              <a:rPr lang="de-DE" sz="2000" dirty="0"/>
               <a:t>e.g., </a:t>
             </a:r>
             <a:r>
-              <a:rPr lang="de-DE" sz="2400" dirty="0" err="1"/>
-              <a:t>managing</a:t>
-            </a:r>
-            <a:r>
-              <a:rPr lang="de-DE" sz="2400" dirty="0"/>
+              <a:rPr lang="de-DE" sz="2000" dirty="0" err="1"/>
+              <a:t>reacting</a:t>
+            </a:r>
+            <a:r>
+              <a:rPr lang="de-DE" sz="2000" dirty="0"/>
+              <a:t> to </a:t>
+            </a:r>
+            <a:r>
+              <a:rPr lang="de-DE" sz="2000" dirty="0" err="1"/>
+              <a:t>classroom</a:t>
+            </a:r>
+            <a:r>
+              <a:rPr lang="de-DE" sz="2000" dirty="0"/>
               <a:t> </a:t>
             </a:r>
             <a:r>
-              <a:rPr lang="de-DE" sz="2400" dirty="0" err="1"/>
-              <a:t>classroom</a:t>
-            </a:r>
-            <a:r>
-              <a:rPr lang="de-DE" sz="2400" dirty="0"/>
-              <a:t> </a:t>
-            </a:r>
-            <a:r>
-              <a:rPr lang="de-DE" sz="2400" dirty="0" err="1"/>
-              <a:t>disruptions</a:t>
-            </a:r>
-            <a:endParaRPr lang="de-DE" sz="2400" dirty="0"/>
+              <a:rPr lang="de-DE" sz="2000" dirty="0" err="1"/>
+              <a:t>disruption</a:t>
+            </a:r>
+            <a:endParaRPr lang="de-DE" sz="2000" dirty="0"/>
           </a:p>
           <a:p>
             <a:pPr algn="ctr"/>
@@ -3780,40 +3771,43 @@
       </p:sp>
       <p:cxnSp>
         <p:nvCxnSpPr>
-          <p:cNvPr id="29" name="Gerade Verbindung mit Pfeil 28">
-            <a:extLst>
-              <a:ext uri="{FF2B5EF4-FFF2-40B4-BE49-F238E27FC236}">
-                <a16:creationId xmlns:a16="http://schemas.microsoft.com/office/drawing/2014/main" id="{691D8F75-3E6C-426C-A972-68EC3E3D4541}"/>
+          <p:cNvPr id="3" name="Gerade Verbindung mit Pfeil 2">
+            <a:extLst>
+              <a:ext uri="{FF2B5EF4-FFF2-40B4-BE49-F238E27FC236}">
+                <a16:creationId xmlns:a16="http://schemas.microsoft.com/office/drawing/2014/main" id="{216E32AC-B9A8-46BE-AA08-F62B3DBD91D6}"/>
               </a:ext>
             </a:extLst>
           </p:cNvPr>
           <p:cNvCxnSpPr>
-            <a:cxnSpLocks/>
+            <a:stCxn id="4" idx="3"/>
+            <a:endCxn id="5" idx="1"/>
           </p:cNvCxnSpPr>
           <p:nvPr/>
         </p:nvCxnSpPr>
         <p:spPr>
           <a:xfrm>
-            <a:off x="4772025" y="1384816"/>
-            <a:ext cx="1837055" cy="1106301"/>
+            <a:off x="3284724" y="2847854"/>
+            <a:ext cx="841604" cy="0"/>
           </a:xfrm>
           <a:prstGeom prst="straightConnector1">
             <a:avLst/>
           </a:prstGeom>
-          <a:ln w="19050">
-            <a:prstDash val="solid"/>
+          <a:ln w="12700">
+            <a:solidFill>
+              <a:schemeClr val="tx1"/>
+            </a:solidFill>
             <a:tailEnd type="triangle"/>
           </a:ln>
         </p:spPr>
         <p:style>
           <a:lnRef idx="1">
-            <a:schemeClr val="dk1"/>
+            <a:schemeClr val="accent1"/>
           </a:lnRef>
           <a:fillRef idx="0">
-            <a:schemeClr val="dk1"/>
+            <a:schemeClr val="accent1"/>
           </a:fillRef>
           <a:effectRef idx="0">
-            <a:schemeClr val="dk1"/>
+            <a:schemeClr val="accent1"/>
           </a:effectRef>
           <a:fontRef idx="minor">
             <a:schemeClr val="tx1"/>
@@ -3822,28 +3816,28 @@
       </p:cxnSp>
       <p:cxnSp>
         <p:nvCxnSpPr>
-          <p:cNvPr id="9" name="Gerade Verbindung mit Pfeil 8">
-            <a:extLst>
-              <a:ext uri="{FF2B5EF4-FFF2-40B4-BE49-F238E27FC236}">
-                <a16:creationId xmlns:a16="http://schemas.microsoft.com/office/drawing/2014/main" id="{D01F001F-3961-4BCD-99E7-F51216A2D0E5}"/>
+          <p:cNvPr id="10" name="Gerade Verbindung mit Pfeil 9">
+            <a:extLst>
+              <a:ext uri="{FF2B5EF4-FFF2-40B4-BE49-F238E27FC236}">
+                <a16:creationId xmlns:a16="http://schemas.microsoft.com/office/drawing/2014/main" id="{78F39405-93C5-4D38-91E0-E6B47520F8AB}"/>
               </a:ext>
             </a:extLst>
           </p:cNvPr>
           <p:cNvCxnSpPr>
-            <a:cxnSpLocks/>
+            <a:stCxn id="5" idx="3"/>
+            <a:endCxn id="6" idx="1"/>
           </p:cNvCxnSpPr>
           <p:nvPr/>
         </p:nvCxnSpPr>
         <p:spPr>
           <a:xfrm>
-            <a:off x="8567960" y="3807024"/>
-            <a:ext cx="1837055" cy="1106301"/>
+            <a:off x="8458200" y="2847854"/>
+            <a:ext cx="841604" cy="0"/>
           </a:xfrm>
           <a:prstGeom prst="straightConnector1">
             <a:avLst/>
           </a:prstGeom>
-          <a:ln w="19050">
-            <a:prstDash val="solid"/>
+          <a:ln w="12700">
             <a:tailEnd type="triangle"/>
           </a:ln>
         </p:spPr>

</xml_diff>

<commit_message>
modell verändert (dritte komponente) + manuskript weitergeschrieben (dritte komponente + knowledge)
</commit_message>
<xml_diff>
--- a/02_paper/02_study/02_expertise_paper/pictures/Professional_Competence_Model.pptx
+++ b/02_paper/02_study/02_expertise_paper/pictures/Professional_Competence_Model.pptx
@@ -117,18 +117,18 @@
   <pc:docChgLst>
     <pc:chgData name="Mandy Klatt" userId="505858402c07da9d" providerId="LiveId" clId="{FA5EC466-BD05-4DCC-91DA-EA1E98BFA00F}"/>
     <pc:docChg chg="undo redo custSel modSld">
-      <pc:chgData name="Mandy Klatt" userId="505858402c07da9d" providerId="LiveId" clId="{FA5EC466-BD05-4DCC-91DA-EA1E98BFA00F}" dt="2025-04-02T13:49:20.058" v="408" actId="20577"/>
+      <pc:chgData name="Mandy Klatt" userId="505858402c07da9d" providerId="LiveId" clId="{FA5EC466-BD05-4DCC-91DA-EA1E98BFA00F}" dt="2025-04-07T16:55:45.675" v="451" actId="1038"/>
       <pc:docMkLst>
         <pc:docMk/>
       </pc:docMkLst>
       <pc:sldChg chg="addSp delSp modSp mod">
-        <pc:chgData name="Mandy Klatt" userId="505858402c07da9d" providerId="LiveId" clId="{FA5EC466-BD05-4DCC-91DA-EA1E98BFA00F}" dt="2025-04-02T13:49:20.058" v="408" actId="20577"/>
+        <pc:chgData name="Mandy Klatt" userId="505858402c07da9d" providerId="LiveId" clId="{FA5EC466-BD05-4DCC-91DA-EA1E98BFA00F}" dt="2025-04-07T16:55:45.675" v="451" actId="1038"/>
         <pc:sldMkLst>
           <pc:docMk/>
           <pc:sldMk cId="387449015" sldId="256"/>
         </pc:sldMkLst>
         <pc:spChg chg="mod">
-          <ac:chgData name="Mandy Klatt" userId="505858402c07da9d" providerId="LiveId" clId="{FA5EC466-BD05-4DCC-91DA-EA1E98BFA00F}" dt="2025-04-02T13:49:20.058" v="408" actId="20577"/>
+          <ac:chgData name="Mandy Klatt" userId="505858402c07da9d" providerId="LiveId" clId="{FA5EC466-BD05-4DCC-91DA-EA1E98BFA00F}" dt="2025-04-07T16:55:45.675" v="451" actId="1038"/>
           <ac:spMkLst>
             <pc:docMk/>
             <pc:sldMk cId="387449015" sldId="256"/>
@@ -136,7 +136,7 @@
           </ac:spMkLst>
         </pc:spChg>
         <pc:spChg chg="mod">
-          <ac:chgData name="Mandy Klatt" userId="505858402c07da9d" providerId="LiveId" clId="{FA5EC466-BD05-4DCC-91DA-EA1E98BFA00F}" dt="2025-04-02T13:23:39.602" v="398" actId="1076"/>
+          <ac:chgData name="Mandy Klatt" userId="505858402c07da9d" providerId="LiveId" clId="{FA5EC466-BD05-4DCC-91DA-EA1E98BFA00F}" dt="2025-04-07T16:55:45.675" v="451" actId="1038"/>
           <ac:spMkLst>
             <pc:docMk/>
             <pc:sldMk cId="387449015" sldId="256"/>
@@ -144,7 +144,7 @@
           </ac:spMkLst>
         </pc:spChg>
         <pc:spChg chg="mod">
-          <ac:chgData name="Mandy Klatt" userId="505858402c07da9d" providerId="LiveId" clId="{FA5EC466-BD05-4DCC-91DA-EA1E98BFA00F}" dt="2025-04-02T13:24:21.812" v="405" actId="1076"/>
+          <ac:chgData name="Mandy Klatt" userId="505858402c07da9d" providerId="LiveId" clId="{FA5EC466-BD05-4DCC-91DA-EA1E98BFA00F}" dt="2025-04-07T16:55:45.675" v="451" actId="1038"/>
           <ac:spMkLst>
             <pc:docMk/>
             <pc:sldMk cId="387449015" sldId="256"/>
@@ -152,7 +152,7 @@
           </ac:spMkLst>
         </pc:spChg>
         <pc:cxnChg chg="add mod">
-          <ac:chgData name="Mandy Klatt" userId="505858402c07da9d" providerId="LiveId" clId="{FA5EC466-BD05-4DCC-91DA-EA1E98BFA00F}" dt="2025-04-02T13:23:51.484" v="400" actId="1582"/>
+          <ac:chgData name="Mandy Klatt" userId="505858402c07da9d" providerId="LiveId" clId="{FA5EC466-BD05-4DCC-91DA-EA1E98BFA00F}" dt="2025-04-07T16:55:45.675" v="451" actId="1038"/>
           <ac:cxnSpMkLst>
             <pc:docMk/>
             <pc:sldMk cId="387449015" sldId="256"/>
@@ -184,7 +184,7 @@
           </ac:cxnSpMkLst>
         </pc:cxnChg>
         <pc:cxnChg chg="add mod">
-          <ac:chgData name="Mandy Klatt" userId="505858402c07da9d" providerId="LiveId" clId="{FA5EC466-BD05-4DCC-91DA-EA1E98BFA00F}" dt="2025-04-02T13:24:21.812" v="405" actId="1076"/>
+          <ac:chgData name="Mandy Klatt" userId="505858402c07da9d" providerId="LiveId" clId="{FA5EC466-BD05-4DCC-91DA-EA1E98BFA00F}" dt="2025-04-07T16:55:45.675" v="451" actId="1038"/>
           <ac:cxnSpMkLst>
             <pc:docMk/>
             <pc:sldMk cId="387449015" sldId="256"/>
@@ -400,7 +400,7 @@
           <a:p>
             <a:fld id="{D999196E-D4C6-4B69-A492-D961CA2AEF86}" type="datetimeFigureOut">
               <a:rPr lang="de-DE" smtClean="0"/>
-              <a:t>02.04.2025</a:t>
+              <a:t>07.04.2025</a:t>
             </a:fld>
             <a:endParaRPr lang="de-DE"/>
           </a:p>
@@ -598,7 +598,7 @@
           <a:p>
             <a:fld id="{D999196E-D4C6-4B69-A492-D961CA2AEF86}" type="datetimeFigureOut">
               <a:rPr lang="de-DE" smtClean="0"/>
-              <a:t>02.04.2025</a:t>
+              <a:t>07.04.2025</a:t>
             </a:fld>
             <a:endParaRPr lang="de-DE"/>
           </a:p>
@@ -806,7 +806,7 @@
           <a:p>
             <a:fld id="{D999196E-D4C6-4B69-A492-D961CA2AEF86}" type="datetimeFigureOut">
               <a:rPr lang="de-DE" smtClean="0"/>
-              <a:t>02.04.2025</a:t>
+              <a:t>07.04.2025</a:t>
             </a:fld>
             <a:endParaRPr lang="de-DE"/>
           </a:p>
@@ -1004,7 +1004,7 @@
           <a:p>
             <a:fld id="{D999196E-D4C6-4B69-A492-D961CA2AEF86}" type="datetimeFigureOut">
               <a:rPr lang="de-DE" smtClean="0"/>
-              <a:t>02.04.2025</a:t>
+              <a:t>07.04.2025</a:t>
             </a:fld>
             <a:endParaRPr lang="de-DE"/>
           </a:p>
@@ -1279,7 +1279,7 @@
           <a:p>
             <a:fld id="{D999196E-D4C6-4B69-A492-D961CA2AEF86}" type="datetimeFigureOut">
               <a:rPr lang="de-DE" smtClean="0"/>
-              <a:t>02.04.2025</a:t>
+              <a:t>07.04.2025</a:t>
             </a:fld>
             <a:endParaRPr lang="de-DE"/>
           </a:p>
@@ -1544,7 +1544,7 @@
           <a:p>
             <a:fld id="{D999196E-D4C6-4B69-A492-D961CA2AEF86}" type="datetimeFigureOut">
               <a:rPr lang="de-DE" smtClean="0"/>
-              <a:t>02.04.2025</a:t>
+              <a:t>07.04.2025</a:t>
             </a:fld>
             <a:endParaRPr lang="de-DE"/>
           </a:p>
@@ -1956,7 +1956,7 @@
           <a:p>
             <a:fld id="{D999196E-D4C6-4B69-A492-D961CA2AEF86}" type="datetimeFigureOut">
               <a:rPr lang="de-DE" smtClean="0"/>
-              <a:t>02.04.2025</a:t>
+              <a:t>07.04.2025</a:t>
             </a:fld>
             <a:endParaRPr lang="de-DE"/>
           </a:p>
@@ -2097,7 +2097,7 @@
           <a:p>
             <a:fld id="{D999196E-D4C6-4B69-A492-D961CA2AEF86}" type="datetimeFigureOut">
               <a:rPr lang="de-DE" smtClean="0"/>
-              <a:t>02.04.2025</a:t>
+              <a:t>07.04.2025</a:t>
             </a:fld>
             <a:endParaRPr lang="de-DE"/>
           </a:p>
@@ -2210,7 +2210,7 @@
           <a:p>
             <a:fld id="{D999196E-D4C6-4B69-A492-D961CA2AEF86}" type="datetimeFigureOut">
               <a:rPr lang="de-DE" smtClean="0"/>
-              <a:t>02.04.2025</a:t>
+              <a:t>07.04.2025</a:t>
             </a:fld>
             <a:endParaRPr lang="de-DE"/>
           </a:p>
@@ -2521,7 +2521,7 @@
           <a:p>
             <a:fld id="{D999196E-D4C6-4B69-A492-D961CA2AEF86}" type="datetimeFigureOut">
               <a:rPr lang="de-DE" smtClean="0"/>
-              <a:t>02.04.2025</a:t>
+              <a:t>07.04.2025</a:t>
             </a:fld>
             <a:endParaRPr lang="de-DE"/>
           </a:p>
@@ -2809,7 +2809,7 @@
           <a:p>
             <a:fld id="{D999196E-D4C6-4B69-A492-D961CA2AEF86}" type="datetimeFigureOut">
               <a:rPr lang="de-DE" smtClean="0"/>
-              <a:t>02.04.2025</a:t>
+              <a:t>07.04.2025</a:t>
             </a:fld>
             <a:endParaRPr lang="de-DE"/>
           </a:p>
@@ -3050,7 +3050,7 @@
           <a:p>
             <a:fld id="{D999196E-D4C6-4B69-A492-D961CA2AEF86}" type="datetimeFigureOut">
               <a:rPr lang="de-DE" smtClean="0"/>
-              <a:t>02.04.2025</a:t>
+              <a:t>07.04.2025</a:t>
             </a:fld>
             <a:endParaRPr lang="de-DE"/>
           </a:p>
@@ -3481,8 +3481,8 @@
         </p:nvSpPr>
         <p:spPr>
           <a:xfrm>
-            <a:off x="882649" y="1615825"/>
-            <a:ext cx="2402075" cy="2464058"/>
+            <a:off x="132178" y="1775220"/>
+            <a:ext cx="3224629" cy="2145268"/>
           </a:xfrm>
           <a:prstGeom prst="roundRect">
             <a:avLst/>
@@ -3576,7 +3576,7 @@
         </p:nvSpPr>
         <p:spPr>
           <a:xfrm>
-            <a:off x="4126328" y="1775220"/>
+            <a:off x="3910428" y="1777758"/>
             <a:ext cx="4331872" cy="2145268"/>
           </a:xfrm>
           <a:prstGeom prst="roundRect">
@@ -3699,8 +3699,8 @@
         </p:nvSpPr>
         <p:spPr>
           <a:xfrm>
-            <a:off x="9299804" y="1582071"/>
-            <a:ext cx="2402075" cy="2531566"/>
+            <a:off x="8795921" y="1735054"/>
+            <a:ext cx="3224629" cy="2213372"/>
           </a:xfrm>
           <a:prstGeom prst="roundRect">
             <a:avLst/>
@@ -3727,7 +3727,15 @@
             <a:pPr algn="ctr"/>
             <a:r>
               <a:rPr lang="de-DE" sz="2400" b="1" dirty="0"/>
-              <a:t>Observable </a:t>
+              <a:t>Student-</a:t>
+            </a:r>
+            <a:r>
+              <a:rPr lang="de-DE" sz="2400" b="1" dirty="0" err="1"/>
+              <a:t>directed</a:t>
+            </a:r>
+            <a:r>
+              <a:rPr lang="de-DE" sz="2400" b="1" dirty="0"/>
+              <a:t> </a:t>
             </a:r>
             <a:r>
               <a:rPr lang="de-DE" sz="2400" b="1" dirty="0" err="1"/>
@@ -3779,6 +3787,7 @@
             </a:extLst>
           </p:cNvPr>
           <p:cNvCxnSpPr>
+            <a:cxnSpLocks/>
             <a:stCxn id="4" idx="3"/>
             <a:endCxn id="5" idx="1"/>
           </p:cNvCxnSpPr>
@@ -3786,8 +3795,8 @@
         </p:nvCxnSpPr>
         <p:spPr>
           <a:xfrm>
-            <a:off x="3284724" y="2847854"/>
-            <a:ext cx="841604" cy="0"/>
+            <a:off x="3356807" y="2847854"/>
+            <a:ext cx="553621" cy="2538"/>
           </a:xfrm>
           <a:prstGeom prst="straightConnector1">
             <a:avLst/>
@@ -3824,15 +3833,16 @@
             </a:extLst>
           </p:cNvPr>
           <p:cNvCxnSpPr>
+            <a:cxnSpLocks/>
             <a:stCxn id="5" idx="3"/>
             <a:endCxn id="6" idx="1"/>
           </p:cNvCxnSpPr>
           <p:nvPr/>
         </p:nvCxnSpPr>
         <p:spPr>
-          <a:xfrm>
-            <a:off x="8458200" y="2847854"/>
-            <a:ext cx="841604" cy="0"/>
+          <a:xfrm flipV="1">
+            <a:off x="8242300" y="2841740"/>
+            <a:ext cx="553621" cy="8652"/>
           </a:xfrm>
           <a:prstGeom prst="straightConnector1">
             <a:avLst/>

</xml_diff>